<commit_message>
implement all key features for brain surgery ready for combining simulation module.
</commit_message>
<xml_diff>
--- a/prototype_ver1/markers - print.pptx
+++ b/prototype_ver1/markers - print.pptx
@@ -243,7 +243,7 @@
           <a:p>
             <a:fld id="{8EC80387-8226-4751-9245-09A11334EB2F}" type="datetimeFigureOut">
               <a:rPr lang="ko-KR" altLang="en-US" smtClean="0"/>
-              <a:t>2020-08-10</a:t>
+              <a:t>2020-08-11</a:t>
             </a:fld>
             <a:endParaRPr lang="ko-KR" altLang="en-US"/>
           </a:p>
@@ -413,7 +413,7 @@
           <a:p>
             <a:fld id="{8EC80387-8226-4751-9245-09A11334EB2F}" type="datetimeFigureOut">
               <a:rPr lang="ko-KR" altLang="en-US" smtClean="0"/>
-              <a:t>2020-08-10</a:t>
+              <a:t>2020-08-11</a:t>
             </a:fld>
             <a:endParaRPr lang="ko-KR" altLang="en-US"/>
           </a:p>
@@ -593,7 +593,7 @@
           <a:p>
             <a:fld id="{8EC80387-8226-4751-9245-09A11334EB2F}" type="datetimeFigureOut">
               <a:rPr lang="ko-KR" altLang="en-US" smtClean="0"/>
-              <a:t>2020-08-10</a:t>
+              <a:t>2020-08-11</a:t>
             </a:fld>
             <a:endParaRPr lang="ko-KR" altLang="en-US"/>
           </a:p>
@@ -763,7 +763,7 @@
           <a:p>
             <a:fld id="{8EC80387-8226-4751-9245-09A11334EB2F}" type="datetimeFigureOut">
               <a:rPr lang="ko-KR" altLang="en-US" smtClean="0"/>
-              <a:t>2020-08-10</a:t>
+              <a:t>2020-08-11</a:t>
             </a:fld>
             <a:endParaRPr lang="ko-KR" altLang="en-US"/>
           </a:p>
@@ -1007,7 +1007,7 @@
           <a:p>
             <a:fld id="{8EC80387-8226-4751-9245-09A11334EB2F}" type="datetimeFigureOut">
               <a:rPr lang="ko-KR" altLang="en-US" smtClean="0"/>
-              <a:t>2020-08-10</a:t>
+              <a:t>2020-08-11</a:t>
             </a:fld>
             <a:endParaRPr lang="ko-KR" altLang="en-US"/>
           </a:p>
@@ -1239,7 +1239,7 @@
           <a:p>
             <a:fld id="{8EC80387-8226-4751-9245-09A11334EB2F}" type="datetimeFigureOut">
               <a:rPr lang="ko-KR" altLang="en-US" smtClean="0"/>
-              <a:t>2020-08-10</a:t>
+              <a:t>2020-08-11</a:t>
             </a:fld>
             <a:endParaRPr lang="ko-KR" altLang="en-US"/>
           </a:p>
@@ -1606,7 +1606,7 @@
           <a:p>
             <a:fld id="{8EC80387-8226-4751-9245-09A11334EB2F}" type="datetimeFigureOut">
               <a:rPr lang="ko-KR" altLang="en-US" smtClean="0"/>
-              <a:t>2020-08-10</a:t>
+              <a:t>2020-08-11</a:t>
             </a:fld>
             <a:endParaRPr lang="ko-KR" altLang="en-US"/>
           </a:p>
@@ -1724,7 +1724,7 @@
           <a:p>
             <a:fld id="{8EC80387-8226-4751-9245-09A11334EB2F}" type="datetimeFigureOut">
               <a:rPr lang="ko-KR" altLang="en-US" smtClean="0"/>
-              <a:t>2020-08-10</a:t>
+              <a:t>2020-08-11</a:t>
             </a:fld>
             <a:endParaRPr lang="ko-KR" altLang="en-US"/>
           </a:p>
@@ -1819,7 +1819,7 @@
           <a:p>
             <a:fld id="{8EC80387-8226-4751-9245-09A11334EB2F}" type="datetimeFigureOut">
               <a:rPr lang="ko-KR" altLang="en-US" smtClean="0"/>
-              <a:t>2020-08-10</a:t>
+              <a:t>2020-08-11</a:t>
             </a:fld>
             <a:endParaRPr lang="ko-KR" altLang="en-US"/>
           </a:p>
@@ -2096,7 +2096,7 @@
           <a:p>
             <a:fld id="{8EC80387-8226-4751-9245-09A11334EB2F}" type="datetimeFigureOut">
               <a:rPr lang="ko-KR" altLang="en-US" smtClean="0"/>
-              <a:t>2020-08-10</a:t>
+              <a:t>2020-08-11</a:t>
             </a:fld>
             <a:endParaRPr lang="ko-KR" altLang="en-US"/>
           </a:p>
@@ -2353,7 +2353,7 @@
           <a:p>
             <a:fld id="{8EC80387-8226-4751-9245-09A11334EB2F}" type="datetimeFigureOut">
               <a:rPr lang="ko-KR" altLang="en-US" smtClean="0"/>
-              <a:t>2020-08-10</a:t>
+              <a:t>2020-08-11</a:t>
             </a:fld>
             <a:endParaRPr lang="ko-KR" altLang="en-US"/>
           </a:p>
@@ -2566,7 +2566,7 @@
           <a:p>
             <a:fld id="{8EC80387-8226-4751-9245-09A11334EB2F}" type="datetimeFigureOut">
               <a:rPr lang="ko-KR" altLang="en-US" smtClean="0"/>
-              <a:t>2020-08-10</a:t>
+              <a:t>2020-08-11</a:t>
             </a:fld>
             <a:endParaRPr lang="ko-KR" altLang="en-US"/>
           </a:p>

</xml_diff>